<commit_message>
Updated ADs, now with QR-codes
</commit_message>
<xml_diff>
--- a/ADs/RCLUB_AD.pptx
+++ b/ADs/RCLUB_AD.pptx
@@ -244,7 +244,7 @@
           <a:p>
             <a:fld id="{9567F887-F087-4807-8063-BBB38B068098}" type="datetimeFigureOut">
               <a:rPr lang="en-US" smtClean="0"/>
-              <a:t>9/20/2023</a:t>
+              <a:t>2/12/2024</a:t>
             </a:fld>
             <a:endParaRPr lang="en-US"/>
           </a:p>
@@ -414,7 +414,7 @@
           <a:p>
             <a:fld id="{9567F887-F087-4807-8063-BBB38B068098}" type="datetimeFigureOut">
               <a:rPr lang="en-US" smtClean="0"/>
-              <a:t>9/20/2023</a:t>
+              <a:t>2/12/2024</a:t>
             </a:fld>
             <a:endParaRPr lang="en-US"/>
           </a:p>
@@ -594,7 +594,7 @@
           <a:p>
             <a:fld id="{9567F887-F087-4807-8063-BBB38B068098}" type="datetimeFigureOut">
               <a:rPr lang="en-US" smtClean="0"/>
-              <a:t>9/20/2023</a:t>
+              <a:t>2/12/2024</a:t>
             </a:fld>
             <a:endParaRPr lang="en-US"/>
           </a:p>
@@ -764,7 +764,7 @@
           <a:p>
             <a:fld id="{9567F887-F087-4807-8063-BBB38B068098}" type="datetimeFigureOut">
               <a:rPr lang="en-US" smtClean="0"/>
-              <a:t>9/20/2023</a:t>
+              <a:t>2/12/2024</a:t>
             </a:fld>
             <a:endParaRPr lang="en-US"/>
           </a:p>
@@ -1008,7 +1008,7 @@
           <a:p>
             <a:fld id="{9567F887-F087-4807-8063-BBB38B068098}" type="datetimeFigureOut">
               <a:rPr lang="en-US" smtClean="0"/>
-              <a:t>9/20/2023</a:t>
+              <a:t>2/12/2024</a:t>
             </a:fld>
             <a:endParaRPr lang="en-US"/>
           </a:p>
@@ -1240,7 +1240,7 @@
           <a:p>
             <a:fld id="{9567F887-F087-4807-8063-BBB38B068098}" type="datetimeFigureOut">
               <a:rPr lang="en-US" smtClean="0"/>
-              <a:t>9/20/2023</a:t>
+              <a:t>2/12/2024</a:t>
             </a:fld>
             <a:endParaRPr lang="en-US"/>
           </a:p>
@@ -1607,7 +1607,7 @@
           <a:p>
             <a:fld id="{9567F887-F087-4807-8063-BBB38B068098}" type="datetimeFigureOut">
               <a:rPr lang="en-US" smtClean="0"/>
-              <a:t>9/20/2023</a:t>
+              <a:t>2/12/2024</a:t>
             </a:fld>
             <a:endParaRPr lang="en-US"/>
           </a:p>
@@ -1725,7 +1725,7 @@
           <a:p>
             <a:fld id="{9567F887-F087-4807-8063-BBB38B068098}" type="datetimeFigureOut">
               <a:rPr lang="en-US" smtClean="0"/>
-              <a:t>9/20/2023</a:t>
+              <a:t>2/12/2024</a:t>
             </a:fld>
             <a:endParaRPr lang="en-US"/>
           </a:p>
@@ -1820,7 +1820,7 @@
           <a:p>
             <a:fld id="{9567F887-F087-4807-8063-BBB38B068098}" type="datetimeFigureOut">
               <a:rPr lang="en-US" smtClean="0"/>
-              <a:t>9/20/2023</a:t>
+              <a:t>2/12/2024</a:t>
             </a:fld>
             <a:endParaRPr lang="en-US"/>
           </a:p>
@@ -2097,7 +2097,7 @@
           <a:p>
             <a:fld id="{9567F887-F087-4807-8063-BBB38B068098}" type="datetimeFigureOut">
               <a:rPr lang="en-US" smtClean="0"/>
-              <a:t>9/20/2023</a:t>
+              <a:t>2/12/2024</a:t>
             </a:fld>
             <a:endParaRPr lang="en-US"/>
           </a:p>
@@ -2354,7 +2354,7 @@
           <a:p>
             <a:fld id="{9567F887-F087-4807-8063-BBB38B068098}" type="datetimeFigureOut">
               <a:rPr lang="en-US" smtClean="0"/>
-              <a:t>9/20/2023</a:t>
+              <a:t>2/12/2024</a:t>
             </a:fld>
             <a:endParaRPr lang="en-US"/>
           </a:p>
@@ -2567,7 +2567,7 @@
           <a:p>
             <a:fld id="{9567F887-F087-4807-8063-BBB38B068098}" type="datetimeFigureOut">
               <a:rPr lang="en-US" smtClean="0"/>
-              <a:t>9/20/2023</a:t>
+              <a:t>2/12/2024</a:t>
             </a:fld>
             <a:endParaRPr lang="en-US"/>
           </a:p>
@@ -3097,9 +3097,22 @@
               </a:path>
             </a:pathLst>
           </a:custGeom>
-          <a:solidFill>
-            <a:srgbClr val="1E64B5"/>
-          </a:solidFill>
+          <a:gradFill flip="none" rotWithShape="1">
+            <a:gsLst>
+              <a:gs pos="0">
+                <a:schemeClr val="accent1">
+                  <a:lumMod val="67000"/>
+                </a:schemeClr>
+              </a:gs>
+              <a:gs pos="100000">
+                <a:srgbClr val="436CB8"/>
+              </a:gs>
+            </a:gsLst>
+            <a:path path="rect">
+              <a:fillToRect l="100000" t="100000"/>
+            </a:path>
+            <a:tileRect r="-100000" b="-100000"/>
+          </a:gradFill>
           <a:ln w="254000">
             <a:solidFill>
               <a:srgbClr val="919198"/>
@@ -3455,7 +3468,7 @@
         <p:spPr>
           <a:xfrm>
             <a:off x="279303" y="3927546"/>
-            <a:ext cx="7058219" cy="4801314"/>
+            <a:ext cx="7058219" cy="3970318"/>
           </a:xfrm>
           <a:custGeom>
             <a:avLst/>
@@ -3848,22 +3861,6 @@
             </a:endParaRPr>
           </a:p>
           <a:p>
-            <a:endParaRPr lang="nb-NO" dirty="0">
-              <a:solidFill>
-                <a:schemeClr val="bg1"/>
-              </a:solidFill>
-              <a:latin typeface="Bahnschrift" panose="020B0502040204020203" pitchFamily="34" charset="0"/>
-            </a:endParaRPr>
-          </a:p>
-          <a:p>
-            <a:endParaRPr lang="nb-NO" dirty="0">
-              <a:solidFill>
-                <a:schemeClr val="bg1"/>
-              </a:solidFill>
-              <a:latin typeface="Bahnschrift" panose="020B0502040204020203" pitchFamily="34" charset="0"/>
-            </a:endParaRPr>
-          </a:p>
-          <a:p>
             <a:r>
               <a:rPr lang="nb-NO" dirty="0">
                 <a:solidFill>
@@ -3871,7 +3868,7 @@
                 </a:solidFill>
                 <a:latin typeface="Bahnschrift" panose="020B0502040204020203" pitchFamily="34" charset="0"/>
               </a:rPr>
-              <a:t>Vi vil hjelpe deg med flokene! </a:t>
+              <a:t>La et ekstra sett med erfarne øyne se på koden din.</a:t>
             </a:r>
           </a:p>
           <a:p>
@@ -3882,18 +3879,7 @@
                 </a:solidFill>
                 <a:latin typeface="Bahnschrift" panose="020B0502040204020203" pitchFamily="34" charset="0"/>
               </a:rPr>
-              <a:t>La et ekstra sett med erfarne øyne se på koden din.</a:t>
-            </a:r>
-          </a:p>
-          <a:p>
-            <a:r>
-              <a:rPr lang="nb-NO" dirty="0">
-                <a:solidFill>
-                  <a:schemeClr val="bg1"/>
-                </a:solidFill>
-                <a:latin typeface="Bahnschrift" panose="020B0502040204020203" pitchFamily="34" charset="0"/>
-              </a:rPr>
-              <a:t>Oppsøk R-klubben og få hjelp med: statistikk, analyse, og presentering av data!</a:t>
+              <a:t>Oppsøk R-klubben og få hjelp med å utføre statistikken, analysen, og presentasjonen av dataene dine!</a:t>
             </a:r>
           </a:p>
           <a:p>
@@ -4091,6 +4077,810 @@
           </a:p>
         </p:txBody>
       </p:sp>
+      <p:pic>
+        <p:nvPicPr>
+          <p:cNvPr id="8" name="Bilde 7">
+            <a:extLst>
+              <a:ext uri="{FF2B5EF4-FFF2-40B4-BE49-F238E27FC236}">
+                <a16:creationId xmlns:a16="http://schemas.microsoft.com/office/drawing/2014/main" id="{9768D830-3BEC-F676-6FA0-150269E080B5}"/>
+              </a:ext>
+            </a:extLst>
+          </p:cNvPr>
+          <p:cNvPicPr>
+            <a:picLocks noChangeAspect="1"/>
+          </p:cNvPicPr>
+          <p:nvPr/>
+        </p:nvPicPr>
+        <p:blipFill>
+          <a:blip r:embed="rId3">
+            <a:extLst>
+              <a:ext uri="{BEBA8EAE-BF5A-486C-A8C5-ECC9F3942E4B}">
+                <a14:imgProps xmlns:a14="http://schemas.microsoft.com/office/drawing/2010/main">
+                  <a14:imgLayer r:embed="rId4">
+                    <a14:imgEffect>
+                      <a14:brightnessContrast bright="40000" contrast="-40000"/>
+                    </a14:imgEffect>
+                  </a14:imgLayer>
+                </a14:imgProps>
+              </a:ext>
+            </a:extLst>
+          </a:blip>
+          <a:stretch>
+            <a:fillRect/>
+          </a:stretch>
+        </p:blipFill>
+        <p:spPr>
+          <a:xfrm>
+            <a:off x="329582" y="8658227"/>
+            <a:ext cx="1767571" cy="1727972"/>
+          </a:xfrm>
+          <a:prstGeom prst="rect">
+            <a:avLst/>
+          </a:prstGeom>
+        </p:spPr>
+      </p:pic>
+      <p:sp>
+        <p:nvSpPr>
+          <p:cNvPr id="9" name="TekstSylinder 8">
+            <a:extLst>
+              <a:ext uri="{FF2B5EF4-FFF2-40B4-BE49-F238E27FC236}">
+                <a16:creationId xmlns:a16="http://schemas.microsoft.com/office/drawing/2014/main" id="{1C385A28-1370-9F54-BE5C-748E72CDB2F2}"/>
+              </a:ext>
+            </a:extLst>
+          </p:cNvPr>
+          <p:cNvSpPr txBox="1"/>
+          <p:nvPr/>
+        </p:nvSpPr>
+        <p:spPr>
+          <a:xfrm>
+            <a:off x="2200275" y="8582025"/>
+            <a:ext cx="4800600" cy="646331"/>
+          </a:xfrm>
+          <a:prstGeom prst="rect">
+            <a:avLst/>
+          </a:prstGeom>
+          <a:noFill/>
+        </p:spPr>
+        <p:txBody>
+          <a:bodyPr wrap="square" rtlCol="0">
+            <a:spAutoFit/>
+          </a:bodyPr>
+          <a:lstStyle/>
+          <a:p>
+            <a:r>
+              <a:rPr lang="en-US" dirty="0">
+                <a:solidFill>
+                  <a:schemeClr val="bg1"/>
+                </a:solidFill>
+                <a:latin typeface="Bahnschrift" panose="020B0502040204020203" pitchFamily="34" charset="0"/>
+              </a:rPr>
+              <a:t>			 				</a:t>
+            </a:r>
+          </a:p>
+          <a:p>
+            <a:endParaRPr lang="en-US" dirty="0"/>
+          </a:p>
+        </p:txBody>
+      </p:sp>
+      <p:sp>
+        <p:nvSpPr>
+          <p:cNvPr id="12" name="TekstSylinder 11">
+            <a:extLst>
+              <a:ext uri="{FF2B5EF4-FFF2-40B4-BE49-F238E27FC236}">
+                <a16:creationId xmlns:a16="http://schemas.microsoft.com/office/drawing/2014/main" id="{B877EEFA-6FB9-C040-01BC-81948E8C3061}"/>
+              </a:ext>
+            </a:extLst>
+          </p:cNvPr>
+          <p:cNvSpPr txBox="1"/>
+          <p:nvPr/>
+        </p:nvSpPr>
+        <p:spPr>
+          <a:xfrm>
+            <a:off x="204060" y="3518175"/>
+            <a:ext cx="3786186" cy="400110"/>
+          </a:xfrm>
+          <a:prstGeom prst="rect">
+            <a:avLst/>
+          </a:prstGeom>
+          <a:noFill/>
+        </p:spPr>
+        <p:txBody>
+          <a:bodyPr wrap="square">
+            <a:spAutoFit/>
+          </a:bodyPr>
+          <a:lstStyle/>
+          <a:p>
+            <a:r>
+              <a:rPr lang="en-US" sz="2000" b="1" i="1" u="sng" dirty="0">
+                <a:solidFill>
+                  <a:schemeClr val="bg1"/>
+                </a:solidFill>
+                <a:latin typeface="Bahnschrift" panose="020B0502040204020203" pitchFamily="34" charset="0"/>
+              </a:rPr>
+              <a:t>Vi er </a:t>
+            </a:r>
+            <a:r>
+              <a:rPr lang="en-US" sz="2000" b="1" i="1" u="sng" dirty="0" err="1">
+                <a:solidFill>
+                  <a:schemeClr val="bg1"/>
+                </a:solidFill>
+                <a:latin typeface="Bahnschrift" panose="020B0502040204020203" pitchFamily="34" charset="0"/>
+              </a:rPr>
+              <a:t>nå</a:t>
+            </a:r>
+            <a:r>
+              <a:rPr lang="en-US" sz="2000" b="1" i="1" u="sng" dirty="0">
+                <a:solidFill>
+                  <a:schemeClr val="bg1"/>
+                </a:solidFill>
+                <a:latin typeface="Bahnschrift" panose="020B0502040204020203" pitchFamily="34" charset="0"/>
+              </a:rPr>
+              <a:t> </a:t>
+            </a:r>
+            <a:r>
+              <a:rPr lang="en-US" sz="2000" b="1" i="1" u="sng" dirty="0" err="1">
+                <a:solidFill>
+                  <a:schemeClr val="bg1"/>
+                </a:solidFill>
+                <a:latin typeface="Bahnschrift" panose="020B0502040204020203" pitchFamily="34" charset="0"/>
+              </a:rPr>
+              <a:t>også</a:t>
+            </a:r>
+            <a:r>
+              <a:rPr lang="en-US" sz="2000" b="1" i="1" u="sng" dirty="0">
+                <a:solidFill>
+                  <a:schemeClr val="bg1"/>
+                </a:solidFill>
+                <a:latin typeface="Bahnschrift" panose="020B0502040204020203" pitchFamily="34" charset="0"/>
+              </a:rPr>
+              <a:t> </a:t>
+            </a:r>
+            <a:r>
+              <a:rPr lang="en-US" sz="2000" b="1" i="1" u="sng" dirty="0" err="1">
+                <a:solidFill>
+                  <a:schemeClr val="bg1"/>
+                </a:solidFill>
+                <a:latin typeface="Bahnschrift" panose="020B0502040204020203" pitchFamily="34" charset="0"/>
+              </a:rPr>
+              <a:t>på</a:t>
+            </a:r>
+            <a:r>
+              <a:rPr lang="en-US" sz="2000" b="1" i="1" u="sng" dirty="0">
+                <a:solidFill>
+                  <a:schemeClr val="bg1"/>
+                </a:solidFill>
+                <a:latin typeface="Bahnschrift" panose="020B0502040204020203" pitchFamily="34" charset="0"/>
+              </a:rPr>
+              <a:t> </a:t>
+            </a:r>
+            <a:r>
+              <a:rPr lang="en-US" sz="2000" b="1" i="1" u="sng" dirty="0" err="1">
+                <a:solidFill>
+                  <a:schemeClr val="bg1"/>
+                </a:solidFill>
+                <a:latin typeface="Bahnschrift" panose="020B0502040204020203" pitchFamily="34" charset="0"/>
+              </a:rPr>
+              <a:t>nett</a:t>
+            </a:r>
+            <a:r>
+              <a:rPr lang="en-US" sz="2000" b="1" i="1" u="sng" dirty="0">
+                <a:solidFill>
+                  <a:schemeClr val="bg1"/>
+                </a:solidFill>
+                <a:latin typeface="Bahnschrift" panose="020B0502040204020203" pitchFamily="34" charset="0"/>
+              </a:rPr>
+              <a:t>!</a:t>
+            </a:r>
+            <a:endParaRPr lang="en-US" b="1" i="1" u="sng" dirty="0"/>
+          </a:p>
+        </p:txBody>
+      </p:sp>
+      <p:sp>
+        <p:nvSpPr>
+          <p:cNvPr id="15" name="TekstSylinder 14">
+            <a:extLst>
+              <a:ext uri="{FF2B5EF4-FFF2-40B4-BE49-F238E27FC236}">
+                <a16:creationId xmlns:a16="http://schemas.microsoft.com/office/drawing/2014/main" id="{412EFC70-4733-F895-6D9D-38E5D3219C16}"/>
+              </a:ext>
+            </a:extLst>
+          </p:cNvPr>
+          <p:cNvSpPr txBox="1"/>
+          <p:nvPr/>
+        </p:nvSpPr>
+        <p:spPr>
+          <a:xfrm>
+            <a:off x="2171043" y="8045285"/>
+            <a:ext cx="1283575" cy="369332"/>
+          </a:xfrm>
+          <a:prstGeom prst="rect">
+            <a:avLst/>
+          </a:prstGeom>
+          <a:noFill/>
+        </p:spPr>
+        <p:txBody>
+          <a:bodyPr wrap="square">
+            <a:spAutoFit/>
+          </a:bodyPr>
+          <a:lstStyle/>
+          <a:p>
+            <a:r>
+              <a:rPr lang="en-US" dirty="0" err="1">
+                <a:solidFill>
+                  <a:schemeClr val="bg1"/>
+                </a:solidFill>
+                <a:latin typeface="Bahnschrift" panose="020B0502040204020203" pitchFamily="34" charset="0"/>
+              </a:rPr>
+              <a:t>Selvhjelp</a:t>
+            </a:r>
+            <a:r>
+              <a:rPr lang="en-US" dirty="0">
+                <a:solidFill>
+                  <a:schemeClr val="bg1"/>
+                </a:solidFill>
+                <a:latin typeface="Bahnschrift" panose="020B0502040204020203" pitchFamily="34" charset="0"/>
+              </a:rPr>
+              <a:t>! </a:t>
+            </a:r>
+            <a:endParaRPr lang="en-US" dirty="0"/>
+          </a:p>
+        </p:txBody>
+      </p:sp>
+      <p:sp>
+        <p:nvSpPr>
+          <p:cNvPr id="17" name="TekstSylinder 16">
+            <a:extLst>
+              <a:ext uri="{FF2B5EF4-FFF2-40B4-BE49-F238E27FC236}">
+                <a16:creationId xmlns:a16="http://schemas.microsoft.com/office/drawing/2014/main" id="{035A9197-722C-1085-42BD-FEFDD8159277}"/>
+              </a:ext>
+            </a:extLst>
+          </p:cNvPr>
+          <p:cNvSpPr txBox="1"/>
+          <p:nvPr/>
+        </p:nvSpPr>
+        <p:spPr>
+          <a:xfrm>
+            <a:off x="4366438" y="8522811"/>
+            <a:ext cx="3786186" cy="369332"/>
+          </a:xfrm>
+          <a:prstGeom prst="rect">
+            <a:avLst/>
+          </a:prstGeom>
+          <a:noFill/>
+        </p:spPr>
+        <p:txBody>
+          <a:bodyPr wrap="square">
+            <a:spAutoFit/>
+          </a:bodyPr>
+          <a:lstStyle/>
+          <a:p>
+            <a:r>
+              <a:rPr lang="en-US" dirty="0">
+                <a:solidFill>
+                  <a:schemeClr val="bg1"/>
+                </a:solidFill>
+                <a:latin typeface="Bahnschrift" panose="020B0502040204020203" pitchFamily="34" charset="0"/>
+              </a:rPr>
+              <a:t>Facebook </a:t>
+            </a:r>
+            <a:r>
+              <a:rPr lang="en-US" dirty="0" err="1">
+                <a:solidFill>
+                  <a:schemeClr val="bg1"/>
+                </a:solidFill>
+                <a:latin typeface="Bahnschrift" panose="020B0502040204020203" pitchFamily="34" charset="0"/>
+              </a:rPr>
+              <a:t>gruppe</a:t>
+            </a:r>
+            <a:r>
+              <a:rPr lang="en-US" dirty="0">
+                <a:solidFill>
+                  <a:schemeClr val="bg1"/>
+                </a:solidFill>
+                <a:latin typeface="Bahnschrift" panose="020B0502040204020203" pitchFamily="34" charset="0"/>
+              </a:rPr>
+              <a:t>!</a:t>
+            </a:r>
+          </a:p>
+        </p:txBody>
+      </p:sp>
+      <p:sp>
+        <p:nvSpPr>
+          <p:cNvPr id="19" name="TekstSylinder 18">
+            <a:extLst>
+              <a:ext uri="{FF2B5EF4-FFF2-40B4-BE49-F238E27FC236}">
+                <a16:creationId xmlns:a16="http://schemas.microsoft.com/office/drawing/2014/main" id="{12FDB767-ED10-A14A-4344-ACCA7A0F9EA5}"/>
+              </a:ext>
+            </a:extLst>
+          </p:cNvPr>
+          <p:cNvSpPr txBox="1"/>
+          <p:nvPr/>
+        </p:nvSpPr>
+        <p:spPr>
+          <a:xfrm>
+            <a:off x="3342546" y="7886004"/>
+            <a:ext cx="1926431" cy="369332"/>
+          </a:xfrm>
+          <a:prstGeom prst="rect">
+            <a:avLst/>
+          </a:prstGeom>
+          <a:noFill/>
+        </p:spPr>
+        <p:txBody>
+          <a:bodyPr wrap="square">
+            <a:spAutoFit/>
+          </a:bodyPr>
+          <a:lstStyle/>
+          <a:p>
+            <a:r>
+              <a:rPr lang="en-US" dirty="0">
+                <a:solidFill>
+                  <a:schemeClr val="bg1"/>
+                </a:solidFill>
+                <a:latin typeface="Bahnschrift" panose="020B0502040204020203" pitchFamily="34" charset="0"/>
+              </a:rPr>
+              <a:t>Gratis R-</a:t>
+            </a:r>
+            <a:r>
+              <a:rPr lang="en-US" dirty="0" err="1">
+                <a:solidFill>
+                  <a:schemeClr val="bg1"/>
+                </a:solidFill>
+                <a:latin typeface="Bahnschrift" panose="020B0502040204020203" pitchFamily="34" charset="0"/>
+              </a:rPr>
+              <a:t>bøker</a:t>
+            </a:r>
+            <a:r>
+              <a:rPr lang="en-US" dirty="0">
+                <a:solidFill>
+                  <a:schemeClr val="bg1"/>
+                </a:solidFill>
+                <a:latin typeface="Bahnschrift" panose="020B0502040204020203" pitchFamily="34" charset="0"/>
+              </a:rPr>
+              <a:t>!</a:t>
+            </a:r>
+          </a:p>
+        </p:txBody>
+      </p:sp>
+      <p:sp>
+        <p:nvSpPr>
+          <p:cNvPr id="21" name="TekstSylinder 20">
+            <a:extLst>
+              <a:ext uri="{FF2B5EF4-FFF2-40B4-BE49-F238E27FC236}">
+                <a16:creationId xmlns:a16="http://schemas.microsoft.com/office/drawing/2014/main" id="{13CDBBF8-184A-7027-F137-7C5872F20C53}"/>
+              </a:ext>
+            </a:extLst>
+          </p:cNvPr>
+          <p:cNvSpPr txBox="1"/>
+          <p:nvPr/>
+        </p:nvSpPr>
+        <p:spPr>
+          <a:xfrm>
+            <a:off x="5231957" y="9061427"/>
+            <a:ext cx="4391024" cy="369332"/>
+          </a:xfrm>
+          <a:prstGeom prst="rect">
+            <a:avLst/>
+          </a:prstGeom>
+          <a:noFill/>
+        </p:spPr>
+        <p:txBody>
+          <a:bodyPr wrap="square">
+            <a:spAutoFit/>
+          </a:bodyPr>
+          <a:lstStyle/>
+          <a:p>
+            <a:r>
+              <a:rPr lang="en-US" dirty="0">
+                <a:solidFill>
+                  <a:schemeClr val="bg1"/>
+                </a:solidFill>
+                <a:latin typeface="Bahnschrift" panose="020B0502040204020203" pitchFamily="34" charset="0"/>
+              </a:rPr>
+              <a:t>Tips!</a:t>
+            </a:r>
+            <a:endParaRPr lang="en-US" dirty="0"/>
+          </a:p>
+        </p:txBody>
+      </p:sp>
+      <p:sp>
+        <p:nvSpPr>
+          <p:cNvPr id="24" name="TekstSylinder 23">
+            <a:extLst>
+              <a:ext uri="{FF2B5EF4-FFF2-40B4-BE49-F238E27FC236}">
+                <a16:creationId xmlns:a16="http://schemas.microsoft.com/office/drawing/2014/main" id="{726E067D-C2BB-0889-0E01-99A689A96257}"/>
+              </a:ext>
+            </a:extLst>
+          </p:cNvPr>
+          <p:cNvSpPr txBox="1"/>
+          <p:nvPr/>
+        </p:nvSpPr>
+        <p:spPr>
+          <a:xfrm>
+            <a:off x="343566" y="7811805"/>
+            <a:ext cx="2521735" cy="369332"/>
+          </a:xfrm>
+          <a:prstGeom prst="rect">
+            <a:avLst/>
+          </a:prstGeom>
+          <a:noFill/>
+        </p:spPr>
+        <p:txBody>
+          <a:bodyPr wrap="square">
+            <a:spAutoFit/>
+          </a:bodyPr>
+          <a:lstStyle/>
+          <a:p>
+            <a:r>
+              <a:rPr lang="en-US" dirty="0">
+                <a:solidFill>
+                  <a:schemeClr val="bg1"/>
+                </a:solidFill>
+                <a:latin typeface="Bahnschrift" panose="020B0502040204020203" pitchFamily="34" charset="0"/>
+              </a:rPr>
+              <a:t>Kart </a:t>
+            </a:r>
+            <a:r>
+              <a:rPr lang="en-US" dirty="0" err="1">
+                <a:solidFill>
+                  <a:schemeClr val="bg1"/>
+                </a:solidFill>
+                <a:latin typeface="Bahnschrift" panose="020B0502040204020203" pitchFamily="34" charset="0"/>
+              </a:rPr>
+              <a:t>til</a:t>
+            </a:r>
+            <a:r>
+              <a:rPr lang="en-US" dirty="0">
+                <a:solidFill>
+                  <a:schemeClr val="bg1"/>
+                </a:solidFill>
+                <a:latin typeface="Bahnschrift" panose="020B0502040204020203" pitchFamily="34" charset="0"/>
+              </a:rPr>
+              <a:t> </a:t>
+            </a:r>
+            <a:r>
+              <a:rPr lang="en-US" dirty="0" err="1">
+                <a:solidFill>
+                  <a:schemeClr val="bg1"/>
+                </a:solidFill>
+                <a:latin typeface="Bahnschrift" panose="020B0502040204020203" pitchFamily="34" charset="0"/>
+              </a:rPr>
+              <a:t>klasserommet</a:t>
+            </a:r>
+            <a:r>
+              <a:rPr lang="en-US" dirty="0">
+                <a:solidFill>
+                  <a:schemeClr val="bg1"/>
+                </a:solidFill>
+                <a:latin typeface="Bahnschrift" panose="020B0502040204020203" pitchFamily="34" charset="0"/>
+              </a:rPr>
+              <a:t>!</a:t>
+            </a:r>
+            <a:endParaRPr lang="en-US" dirty="0"/>
+          </a:p>
+        </p:txBody>
+      </p:sp>
+      <p:sp>
+        <p:nvSpPr>
+          <p:cNvPr id="26" name="TekstSylinder 25">
+            <a:extLst>
+              <a:ext uri="{FF2B5EF4-FFF2-40B4-BE49-F238E27FC236}">
+                <a16:creationId xmlns:a16="http://schemas.microsoft.com/office/drawing/2014/main" id="{5CDC1F84-30F2-A551-A36E-D49BA9D83B65}"/>
+              </a:ext>
+            </a:extLst>
+          </p:cNvPr>
+          <p:cNvSpPr txBox="1"/>
+          <p:nvPr/>
+        </p:nvSpPr>
+        <p:spPr>
+          <a:xfrm>
+            <a:off x="2865301" y="8854728"/>
+            <a:ext cx="4595812" cy="369332"/>
+          </a:xfrm>
+          <a:prstGeom prst="rect">
+            <a:avLst/>
+          </a:prstGeom>
+          <a:noFill/>
+        </p:spPr>
+        <p:txBody>
+          <a:bodyPr wrap="square">
+            <a:spAutoFit/>
+          </a:bodyPr>
+          <a:lstStyle/>
+          <a:p>
+            <a:r>
+              <a:rPr lang="en-US" dirty="0" err="1">
+                <a:solidFill>
+                  <a:schemeClr val="bg1"/>
+                </a:solidFill>
+                <a:latin typeface="Bahnschrift" panose="020B0502040204020203" pitchFamily="34" charset="0"/>
+              </a:rPr>
+              <a:t>Jukselapper</a:t>
+            </a:r>
+            <a:r>
+              <a:rPr lang="en-US" dirty="0">
+                <a:solidFill>
+                  <a:schemeClr val="bg1"/>
+                </a:solidFill>
+                <a:latin typeface="Bahnschrift" panose="020B0502040204020203" pitchFamily="34" charset="0"/>
+              </a:rPr>
+              <a:t>! </a:t>
+            </a:r>
+            <a:endParaRPr lang="en-US" dirty="0"/>
+          </a:p>
+        </p:txBody>
+      </p:sp>
+      <p:cxnSp>
+        <p:nvCxnSpPr>
+          <p:cNvPr id="30" name="Rett pilkobling 29">
+            <a:extLst>
+              <a:ext uri="{FF2B5EF4-FFF2-40B4-BE49-F238E27FC236}">
+                <a16:creationId xmlns:a16="http://schemas.microsoft.com/office/drawing/2014/main" id="{C65D63ED-9AAC-96F0-17BA-66E8ED341D7D}"/>
+              </a:ext>
+            </a:extLst>
+          </p:cNvPr>
+          <p:cNvCxnSpPr>
+            <a:cxnSpLocks/>
+            <a:stCxn id="26" idx="1"/>
+          </p:cNvCxnSpPr>
+          <p:nvPr/>
+        </p:nvCxnSpPr>
+        <p:spPr>
+          <a:xfrm flipH="1">
+            <a:off x="2200275" y="9039394"/>
+            <a:ext cx="665026" cy="175272"/>
+          </a:xfrm>
+          <a:prstGeom prst="straightConnector1">
+            <a:avLst/>
+          </a:prstGeom>
+          <a:ln w="57150">
+            <a:solidFill>
+              <a:schemeClr val="bg1"/>
+            </a:solidFill>
+            <a:tailEnd type="triangle"/>
+          </a:ln>
+        </p:spPr>
+        <p:style>
+          <a:lnRef idx="3">
+            <a:schemeClr val="accent1"/>
+          </a:lnRef>
+          <a:fillRef idx="0">
+            <a:schemeClr val="accent1"/>
+          </a:fillRef>
+          <a:effectRef idx="2">
+            <a:schemeClr val="accent1"/>
+          </a:effectRef>
+          <a:fontRef idx="minor">
+            <a:schemeClr val="tx1"/>
+          </a:fontRef>
+        </p:style>
+      </p:cxnSp>
+      <p:cxnSp>
+        <p:nvCxnSpPr>
+          <p:cNvPr id="33" name="Rett pilkobling 32">
+            <a:extLst>
+              <a:ext uri="{FF2B5EF4-FFF2-40B4-BE49-F238E27FC236}">
+                <a16:creationId xmlns:a16="http://schemas.microsoft.com/office/drawing/2014/main" id="{4B511037-B0E8-6005-5158-C7A51122D8C5}"/>
+              </a:ext>
+            </a:extLst>
+          </p:cNvPr>
+          <p:cNvCxnSpPr>
+            <a:cxnSpLocks/>
+            <a:stCxn id="17" idx="1"/>
+            <a:endCxn id="9" idx="1"/>
+          </p:cNvCxnSpPr>
+          <p:nvPr/>
+        </p:nvCxnSpPr>
+        <p:spPr>
+          <a:xfrm flipH="1">
+            <a:off x="2200275" y="8707477"/>
+            <a:ext cx="2166163" cy="197714"/>
+          </a:xfrm>
+          <a:prstGeom prst="straightConnector1">
+            <a:avLst/>
+          </a:prstGeom>
+          <a:ln w="57150">
+            <a:solidFill>
+              <a:schemeClr val="bg1"/>
+            </a:solidFill>
+            <a:tailEnd type="triangle"/>
+          </a:ln>
+        </p:spPr>
+        <p:style>
+          <a:lnRef idx="3">
+            <a:schemeClr val="accent1"/>
+          </a:lnRef>
+          <a:fillRef idx="0">
+            <a:schemeClr val="accent1"/>
+          </a:fillRef>
+          <a:effectRef idx="2">
+            <a:schemeClr val="accent1"/>
+          </a:effectRef>
+          <a:fontRef idx="minor">
+            <a:schemeClr val="tx1"/>
+          </a:fontRef>
+        </p:style>
+      </p:cxnSp>
+      <p:cxnSp>
+        <p:nvCxnSpPr>
+          <p:cNvPr id="36" name="Rett pilkobling 35">
+            <a:extLst>
+              <a:ext uri="{FF2B5EF4-FFF2-40B4-BE49-F238E27FC236}">
+                <a16:creationId xmlns:a16="http://schemas.microsoft.com/office/drawing/2014/main" id="{4309C914-CCCB-9BD6-FDB1-52D31194127F}"/>
+              </a:ext>
+            </a:extLst>
+          </p:cNvPr>
+          <p:cNvCxnSpPr>
+            <a:cxnSpLocks/>
+            <a:stCxn id="19" idx="2"/>
+          </p:cNvCxnSpPr>
+          <p:nvPr/>
+        </p:nvCxnSpPr>
+        <p:spPr>
+          <a:xfrm flipH="1">
+            <a:off x="2200275" y="8255336"/>
+            <a:ext cx="2105487" cy="477090"/>
+          </a:xfrm>
+          <a:prstGeom prst="straightConnector1">
+            <a:avLst/>
+          </a:prstGeom>
+          <a:ln w="57150">
+            <a:solidFill>
+              <a:schemeClr val="bg1"/>
+            </a:solidFill>
+            <a:tailEnd type="triangle"/>
+          </a:ln>
+        </p:spPr>
+        <p:style>
+          <a:lnRef idx="3">
+            <a:schemeClr val="accent1"/>
+          </a:lnRef>
+          <a:fillRef idx="0">
+            <a:schemeClr val="accent1"/>
+          </a:fillRef>
+          <a:effectRef idx="2">
+            <a:schemeClr val="accent1"/>
+          </a:effectRef>
+          <a:fontRef idx="minor">
+            <a:schemeClr val="tx1"/>
+          </a:fontRef>
+        </p:style>
+      </p:cxnSp>
+      <p:cxnSp>
+        <p:nvCxnSpPr>
+          <p:cNvPr id="41" name="Rett pilkobling 40">
+            <a:extLst>
+              <a:ext uri="{FF2B5EF4-FFF2-40B4-BE49-F238E27FC236}">
+                <a16:creationId xmlns:a16="http://schemas.microsoft.com/office/drawing/2014/main" id="{4B511037-B0E8-6005-5158-C7A51122D8C5}"/>
+              </a:ext>
+            </a:extLst>
+          </p:cNvPr>
+          <p:cNvCxnSpPr>
+            <a:cxnSpLocks/>
+            <a:stCxn id="24" idx="2"/>
+            <a:endCxn id="8" idx="0"/>
+          </p:cNvCxnSpPr>
+          <p:nvPr/>
+        </p:nvCxnSpPr>
+        <p:spPr>
+          <a:xfrm flipH="1">
+            <a:off x="1213368" y="8181137"/>
+            <a:ext cx="391066" cy="477090"/>
+          </a:xfrm>
+          <a:prstGeom prst="straightConnector1">
+            <a:avLst/>
+          </a:prstGeom>
+          <a:ln w="57150">
+            <a:solidFill>
+              <a:schemeClr val="bg1"/>
+            </a:solidFill>
+            <a:tailEnd type="triangle"/>
+          </a:ln>
+        </p:spPr>
+        <p:style>
+          <a:lnRef idx="3">
+            <a:schemeClr val="accent1"/>
+          </a:lnRef>
+          <a:fillRef idx="0">
+            <a:schemeClr val="accent1"/>
+          </a:fillRef>
+          <a:effectRef idx="2">
+            <a:schemeClr val="accent1"/>
+          </a:effectRef>
+          <a:fontRef idx="minor">
+            <a:schemeClr val="tx1"/>
+          </a:fontRef>
+        </p:style>
+      </p:cxnSp>
+      <p:cxnSp>
+        <p:nvCxnSpPr>
+          <p:cNvPr id="45" name="Rett pilkobling 44">
+            <a:extLst>
+              <a:ext uri="{FF2B5EF4-FFF2-40B4-BE49-F238E27FC236}">
+                <a16:creationId xmlns:a16="http://schemas.microsoft.com/office/drawing/2014/main" id="{C36FB674-97D1-4F17-0A4A-D2666E45B7F5}"/>
+              </a:ext>
+            </a:extLst>
+          </p:cNvPr>
+          <p:cNvCxnSpPr>
+            <a:cxnSpLocks/>
+            <a:stCxn id="15" idx="1"/>
+          </p:cNvCxnSpPr>
+          <p:nvPr/>
+        </p:nvCxnSpPr>
+        <p:spPr>
+          <a:xfrm flipH="1">
+            <a:off x="1892164" y="8229951"/>
+            <a:ext cx="278879" cy="472514"/>
+          </a:xfrm>
+          <a:prstGeom prst="straightConnector1">
+            <a:avLst/>
+          </a:prstGeom>
+          <a:ln w="57150">
+            <a:solidFill>
+              <a:schemeClr val="bg1"/>
+            </a:solidFill>
+            <a:tailEnd type="triangle"/>
+          </a:ln>
+        </p:spPr>
+        <p:style>
+          <a:lnRef idx="3">
+            <a:schemeClr val="accent1"/>
+          </a:lnRef>
+          <a:fillRef idx="0">
+            <a:schemeClr val="accent1"/>
+          </a:fillRef>
+          <a:effectRef idx="2">
+            <a:schemeClr val="accent1"/>
+          </a:effectRef>
+          <a:fontRef idx="minor">
+            <a:schemeClr val="tx1"/>
+          </a:fontRef>
+        </p:style>
+      </p:cxnSp>
+      <p:cxnSp>
+        <p:nvCxnSpPr>
+          <p:cNvPr id="55" name="Rett pilkobling 54">
+            <a:extLst>
+              <a:ext uri="{FF2B5EF4-FFF2-40B4-BE49-F238E27FC236}">
+                <a16:creationId xmlns:a16="http://schemas.microsoft.com/office/drawing/2014/main" id="{3A51598D-086D-7422-79E4-464F04C43E8E}"/>
+              </a:ext>
+            </a:extLst>
+          </p:cNvPr>
+          <p:cNvCxnSpPr>
+            <a:cxnSpLocks/>
+            <a:stCxn id="21" idx="1"/>
+          </p:cNvCxnSpPr>
+          <p:nvPr/>
+        </p:nvCxnSpPr>
+        <p:spPr>
+          <a:xfrm flipH="1">
+            <a:off x="2240476" y="9246093"/>
+            <a:ext cx="2991481" cy="147251"/>
+          </a:xfrm>
+          <a:prstGeom prst="straightConnector1">
+            <a:avLst/>
+          </a:prstGeom>
+          <a:ln w="57150">
+            <a:solidFill>
+              <a:schemeClr val="bg1"/>
+            </a:solidFill>
+            <a:tailEnd type="triangle"/>
+          </a:ln>
+        </p:spPr>
+        <p:style>
+          <a:lnRef idx="3">
+            <a:schemeClr val="accent1"/>
+          </a:lnRef>
+          <a:fillRef idx="0">
+            <a:schemeClr val="accent1"/>
+          </a:fillRef>
+          <a:effectRef idx="2">
+            <a:schemeClr val="accent1"/>
+          </a:effectRef>
+          <a:fontRef idx="minor">
+            <a:schemeClr val="tx1"/>
+          </a:fontRef>
+        </p:style>
+      </p:cxnSp>
     </p:spTree>
     <p:extLst>
       <p:ext uri="{BB962C8B-B14F-4D97-AF65-F5344CB8AC3E}">
@@ -4123,10 +4913,10 @@
       </p:grpSpPr>
       <p:sp>
         <p:nvSpPr>
-          <p:cNvPr id="11" name="Rektangel: ett klippet og ett avrundet hjørne øverst 10">
+          <p:cNvPr id="8" name="Rektangel: ett klippet og ett avrundet hjørne øverst 10">
             <a:extLst>
               <a:ext uri="{FF2B5EF4-FFF2-40B4-BE49-F238E27FC236}">
-                <a16:creationId xmlns:a16="http://schemas.microsoft.com/office/drawing/2014/main" id="{632DA5A5-18B3-2CF8-9AC0-FCD93A2095D2}"/>
+                <a16:creationId xmlns:a16="http://schemas.microsoft.com/office/drawing/2014/main" id="{CB35AB4B-780B-31D4-A9C6-08A85FED12A6}"/>
               </a:ext>
             </a:extLst>
           </p:cNvPr>
@@ -4135,8 +4925,8 @@
         </p:nvSpPr>
         <p:spPr>
           <a:xfrm>
-            <a:off x="121920" y="1981199"/>
-            <a:ext cx="7309961" cy="8585201"/>
+            <a:off x="114300" y="1981199"/>
+            <a:ext cx="7317581" cy="8585201"/>
           </a:xfrm>
           <a:custGeom>
             <a:avLst/>
@@ -4246,9 +5036,22 @@
               </a:path>
             </a:pathLst>
           </a:custGeom>
-          <a:solidFill>
-            <a:srgbClr val="1E64B5"/>
-          </a:solidFill>
+          <a:gradFill flip="none" rotWithShape="1">
+            <a:gsLst>
+              <a:gs pos="0">
+                <a:schemeClr val="accent1">
+                  <a:lumMod val="67000"/>
+                </a:schemeClr>
+              </a:gs>
+              <a:gs pos="100000">
+                <a:srgbClr val="436CB8"/>
+              </a:gs>
+            </a:gsLst>
+            <a:path path="rect">
+              <a:fillToRect l="100000" t="100000"/>
+            </a:path>
+            <a:tileRect r="-100000" b="-100000"/>
+          </a:gradFill>
           <a:ln w="254000">
             <a:solidFill>
               <a:srgbClr val="919198"/>
@@ -4276,7 +5079,7 @@
           <a:lstStyle/>
           <a:p>
             <a:pPr algn="ctr"/>
-            <a:endParaRPr lang="en-US" dirty="0"/>
+            <a:endParaRPr lang="en-US"/>
           </a:p>
         </p:txBody>
       </p:sp>
@@ -4413,7 +5216,7 @@
                 </a:solidFill>
                 <a:latin typeface="Bahnschrift" panose="020B0502040204020203" pitchFamily="34" charset="0"/>
               </a:rPr>
-              <a:t>Every Wednesday | 12:00-14:00 | room S124 </a:t>
+              <a:t>Every Wednesday | 12:00-14:00 | S124 </a:t>
             </a:r>
             <a:r>
               <a:rPr lang="en-US" u="sng" dirty="0" err="1">
@@ -4440,7 +5243,7 @@
                 </a:solidFill>
                 <a:latin typeface="Bahnschrift" panose="020B0502040204020203" pitchFamily="34" charset="0"/>
               </a:rPr>
-              <a:t>Every Wednesday | 12:00-14:00 | room S124 </a:t>
+              <a:t>Every Wednesday | 12:00-14:00 | S124 </a:t>
             </a:r>
             <a:r>
               <a:rPr lang="en-US" u="sng" dirty="0" err="1">
@@ -4467,16 +5270,7 @@
                 </a:solidFill>
                 <a:latin typeface="Bahnschrift" panose="020B0502040204020203" pitchFamily="34" charset="0"/>
               </a:rPr>
-              <a:t>Every Wednesday | 12:00-14:00 | </a:t>
-            </a:r>
-            <a:r>
-              <a:rPr lang="en-US" u="sng">
-                <a:solidFill>
-                  <a:schemeClr val="bg1"/>
-                </a:solidFill>
-                <a:latin typeface="Bahnschrift" panose="020B0502040204020203" pitchFamily="34" charset="0"/>
-              </a:rPr>
-              <a:t>room S124 </a:t>
+              <a:t>Every Wednesday | 12:00-14:00 | S124 </a:t>
             </a:r>
             <a:r>
               <a:rPr lang="en-US" u="sng" dirty="0" err="1">
@@ -4528,8 +5322,8 @@
         </p:nvSpPr>
         <p:spPr>
           <a:xfrm>
-            <a:off x="279303" y="4261375"/>
-            <a:ext cx="7058219" cy="5078313"/>
+            <a:off x="279303" y="4032775"/>
+            <a:ext cx="7058219" cy="3416320"/>
           </a:xfrm>
           <a:custGeom>
             <a:avLst/>
@@ -4881,10 +5675,17 @@
                 </a:solidFill>
                 <a:latin typeface="Bahnschrift" panose="020B0502040204020203" pitchFamily="34" charset="0"/>
               </a:rPr>
-              <a:t>Are you struggling with analyzing your datasets?</a:t>
-            </a:r>
-          </a:p>
-          <a:p>
+              <a:t>Does your advisor know </a:t>
+            </a:r>
+            <a:r>
+              <a:rPr lang="en-US" i="1" dirty="0">
+                <a:solidFill>
+                  <a:schemeClr val="bg1"/>
+                </a:solidFill>
+                <a:latin typeface="Bahnschrift" panose="020B0502040204020203" pitchFamily="34" charset="0"/>
+              </a:rPr>
+              <a:t>everything, </a:t>
+            </a:r>
             <a:r>
               <a:rPr lang="en-US" dirty="0">
                 <a:solidFill>
@@ -4892,25 +5693,7 @@
                 </a:solidFill>
                 <a:latin typeface="Bahnschrift" panose="020B0502040204020203" pitchFamily="34" charset="0"/>
               </a:rPr>
-              <a:t>Does your advisor know everything </a:t>
-            </a:r>
-            <a:r>
-              <a:rPr lang="en-US" i="1" dirty="0">
-                <a:solidFill>
-                  <a:schemeClr val="bg1"/>
-                </a:solidFill>
-                <a:latin typeface="Bahnschrift" panose="020B0502040204020203" pitchFamily="34" charset="0"/>
-              </a:rPr>
-              <a:t>except </a:t>
-            </a:r>
-            <a:r>
-              <a:rPr lang="en-US" dirty="0">
-                <a:solidFill>
-                  <a:schemeClr val="bg1"/>
-                </a:solidFill>
-                <a:latin typeface="Bahnschrift" panose="020B0502040204020203" pitchFamily="34" charset="0"/>
-              </a:rPr>
-              <a:t>for programming?</a:t>
+              <a:t>except R?</a:t>
             </a:r>
           </a:p>
           <a:p>
@@ -4922,6 +5705,57 @@
             </a:endParaRPr>
           </a:p>
           <a:p>
+            <a:r>
+              <a:rPr lang="en-US" dirty="0">
+                <a:solidFill>
+                  <a:schemeClr val="bg1"/>
+                </a:solidFill>
+                <a:latin typeface="Bahnschrift" panose="020B0502040204020203" pitchFamily="34" charset="0"/>
+              </a:rPr>
+              <a:t>We </a:t>
+            </a:r>
+            <a:r>
+              <a:rPr lang="en-US" i="1" dirty="0">
+                <a:solidFill>
+                  <a:schemeClr val="bg1"/>
+                </a:solidFill>
+                <a:latin typeface="Bahnschrift" panose="020B0502040204020203" pitchFamily="34" charset="0"/>
+              </a:rPr>
+              <a:t>want </a:t>
+            </a:r>
+            <a:r>
+              <a:rPr lang="en-US" dirty="0">
+                <a:solidFill>
+                  <a:schemeClr val="bg1"/>
+                </a:solidFill>
+                <a:latin typeface="Bahnschrift" panose="020B0502040204020203" pitchFamily="34" charset="0"/>
+              </a:rPr>
+              <a:t>to help you! </a:t>
+            </a:r>
+          </a:p>
+          <a:p>
+            <a:r>
+              <a:rPr lang="en-US" dirty="0">
+                <a:solidFill>
+                  <a:schemeClr val="bg1"/>
+                </a:solidFill>
+                <a:latin typeface="Bahnschrift" panose="020B0502040204020203" pitchFamily="34" charset="0"/>
+              </a:rPr>
+              <a:t>Get an extra set of experienced eyes to look at your code.</a:t>
+            </a:r>
+          </a:p>
+          <a:p>
+            <a:r>
+              <a:rPr lang="en-US" dirty="0">
+                <a:solidFill>
+                  <a:schemeClr val="bg1"/>
+                </a:solidFill>
+                <a:latin typeface="Bahnschrift" panose="020B0502040204020203" pitchFamily="34" charset="0"/>
+              </a:rPr>
+              <a:t>Drop by the R-club and get help with doing your statistics, analysis, and the presentation of your data!</a:t>
+            </a:r>
+          </a:p>
+          <a:p>
             <a:endParaRPr lang="en-US" dirty="0">
               <a:solidFill>
                 <a:schemeClr val="bg1"/>
@@ -4930,14 +5764,6 @@
             </a:endParaRPr>
           </a:p>
           <a:p>
-            <a:endParaRPr lang="en-US" dirty="0">
-              <a:solidFill>
-                <a:schemeClr val="bg1"/>
-              </a:solidFill>
-              <a:latin typeface="Bahnschrift" panose="020B0502040204020203" pitchFamily="34" charset="0"/>
-            </a:endParaRPr>
-          </a:p>
-          <a:p>
             <a:r>
               <a:rPr lang="en-US" dirty="0">
                 <a:solidFill>
@@ -4945,73 +5771,8 @@
                 </a:solidFill>
                 <a:latin typeface="Bahnschrift" panose="020B0502040204020203" pitchFamily="34" charset="0"/>
               </a:rPr>
-              <a:t>We want to help you! </a:t>
-            </a:r>
-          </a:p>
-          <a:p>
-            <a:r>
-              <a:rPr lang="en-US" dirty="0">
-                <a:solidFill>
-                  <a:schemeClr val="bg1"/>
-                </a:solidFill>
-                <a:latin typeface="Bahnschrift" panose="020B0502040204020203" pitchFamily="34" charset="0"/>
-              </a:rPr>
-              <a:t>Get an extra set of experienced eyes to look at your code.</a:t>
-            </a:r>
-          </a:p>
-          <a:p>
-            <a:r>
-              <a:rPr lang="en-US" dirty="0">
-                <a:solidFill>
-                  <a:schemeClr val="bg1"/>
-                </a:solidFill>
-                <a:latin typeface="Bahnschrift" panose="020B0502040204020203" pitchFamily="34" charset="0"/>
-              </a:rPr>
-              <a:t>Drop by the R-club and get help with statistics, analysis, and presenting your data!</a:t>
-            </a:r>
-          </a:p>
-          <a:p>
-            <a:endParaRPr lang="en-US" dirty="0">
-              <a:solidFill>
-                <a:schemeClr val="bg1"/>
-              </a:solidFill>
-              <a:latin typeface="Bahnschrift" panose="020B0502040204020203" pitchFamily="34" charset="0"/>
-            </a:endParaRPr>
-          </a:p>
-          <a:p>
-            <a:endParaRPr lang="en-US" dirty="0">
-              <a:solidFill>
-                <a:schemeClr val="bg1"/>
-              </a:solidFill>
-              <a:latin typeface="Bahnschrift" panose="020B0502040204020203" pitchFamily="34" charset="0"/>
-            </a:endParaRPr>
-          </a:p>
-          <a:p>
-            <a:r>
-              <a:rPr lang="en-US" dirty="0">
-                <a:solidFill>
-                  <a:schemeClr val="bg1"/>
-                </a:solidFill>
-                <a:latin typeface="Bahnschrift" panose="020B0502040204020203" pitchFamily="34" charset="0"/>
-              </a:rPr>
               <a:t>If we don’t know the solution, we’ll figure it out together!</a:t>
             </a:r>
-          </a:p>
-          <a:p>
-            <a:endParaRPr lang="nb-NO" dirty="0">
-              <a:solidFill>
-                <a:schemeClr val="bg1"/>
-              </a:solidFill>
-              <a:latin typeface="Bahnschrift" panose="020B0502040204020203" pitchFamily="34" charset="0"/>
-            </a:endParaRPr>
-          </a:p>
-          <a:p>
-            <a:endParaRPr lang="en-US" dirty="0">
-              <a:solidFill>
-                <a:schemeClr val="bg1"/>
-              </a:solidFill>
-              <a:latin typeface="Bahnschrift" panose="020B0502040204020203" pitchFamily="34" charset="0"/>
-            </a:endParaRPr>
           </a:p>
           <a:p>
             <a:r>
@@ -5070,6 +5831,629 @@
             <a:endParaRPr lang="nb-NO" dirty="0">
               <a:latin typeface="Bahnschrift" panose="020B0502040204020203" pitchFamily="34" charset="0"/>
             </a:endParaRPr>
+          </a:p>
+        </p:txBody>
+      </p:sp>
+      <p:pic>
+        <p:nvPicPr>
+          <p:cNvPr id="9" name="Bilde 8">
+            <a:extLst>
+              <a:ext uri="{FF2B5EF4-FFF2-40B4-BE49-F238E27FC236}">
+                <a16:creationId xmlns:a16="http://schemas.microsoft.com/office/drawing/2014/main" id="{B9586917-08C2-65BE-AEEA-5572B63FCE2D}"/>
+              </a:ext>
+            </a:extLst>
+          </p:cNvPr>
+          <p:cNvPicPr>
+            <a:picLocks noChangeAspect="1"/>
+          </p:cNvPicPr>
+          <p:nvPr/>
+        </p:nvPicPr>
+        <p:blipFill>
+          <a:blip r:embed="rId3">
+            <a:extLst>
+              <a:ext uri="{28A0092B-C50C-407E-A947-70E740481C1C}">
+                <a14:useLocalDpi xmlns:a14="http://schemas.microsoft.com/office/drawing/2010/main" val="0"/>
+              </a:ext>
+            </a:extLst>
+          </a:blip>
+          <a:srcRect/>
+          <a:stretch/>
+        </p:blipFill>
+        <p:spPr>
+          <a:xfrm>
+            <a:off x="331128" y="8658227"/>
+            <a:ext cx="1764478" cy="1727972"/>
+          </a:xfrm>
+          <a:prstGeom prst="rect">
+            <a:avLst/>
+          </a:prstGeom>
+        </p:spPr>
+      </p:pic>
+      <p:sp>
+        <p:nvSpPr>
+          <p:cNvPr id="10" name="TekstSylinder 9">
+            <a:extLst>
+              <a:ext uri="{FF2B5EF4-FFF2-40B4-BE49-F238E27FC236}">
+                <a16:creationId xmlns:a16="http://schemas.microsoft.com/office/drawing/2014/main" id="{1C4E326A-75E4-7A07-5BD8-7F380CA4E537}"/>
+              </a:ext>
+            </a:extLst>
+          </p:cNvPr>
+          <p:cNvSpPr txBox="1"/>
+          <p:nvPr/>
+        </p:nvSpPr>
+        <p:spPr>
+          <a:xfrm>
+            <a:off x="2903337" y="7606665"/>
+            <a:ext cx="2041549" cy="369332"/>
+          </a:xfrm>
+          <a:prstGeom prst="rect">
+            <a:avLst/>
+          </a:prstGeom>
+          <a:noFill/>
+        </p:spPr>
+        <p:txBody>
+          <a:bodyPr wrap="square">
+            <a:spAutoFit/>
+          </a:bodyPr>
+          <a:lstStyle/>
+          <a:p>
+            <a:r>
+              <a:rPr lang="en-US" dirty="0">
+                <a:solidFill>
+                  <a:schemeClr val="bg1"/>
+                </a:solidFill>
+                <a:latin typeface="Bahnschrift" panose="020B0502040204020203" pitchFamily="34" charset="0"/>
+              </a:rPr>
+              <a:t>Self help guides! </a:t>
+            </a:r>
+            <a:endParaRPr lang="en-US" dirty="0"/>
+          </a:p>
+        </p:txBody>
+      </p:sp>
+      <p:sp>
+        <p:nvSpPr>
+          <p:cNvPr id="12" name="TekstSylinder 11">
+            <a:extLst>
+              <a:ext uri="{FF2B5EF4-FFF2-40B4-BE49-F238E27FC236}">
+                <a16:creationId xmlns:a16="http://schemas.microsoft.com/office/drawing/2014/main" id="{FD508BEC-0430-2FBC-2A0B-67598703C4C7}"/>
+              </a:ext>
+            </a:extLst>
+          </p:cNvPr>
+          <p:cNvSpPr txBox="1"/>
+          <p:nvPr/>
+        </p:nvSpPr>
+        <p:spPr>
+          <a:xfrm>
+            <a:off x="4708284" y="8436525"/>
+            <a:ext cx="3786186" cy="369332"/>
+          </a:xfrm>
+          <a:prstGeom prst="rect">
+            <a:avLst/>
+          </a:prstGeom>
+          <a:noFill/>
+        </p:spPr>
+        <p:txBody>
+          <a:bodyPr wrap="square">
+            <a:spAutoFit/>
+          </a:bodyPr>
+          <a:lstStyle/>
+          <a:p>
+            <a:r>
+              <a:rPr lang="en-US" dirty="0">
+                <a:solidFill>
+                  <a:schemeClr val="bg1"/>
+                </a:solidFill>
+                <a:latin typeface="Bahnschrift" panose="020B0502040204020203" pitchFamily="34" charset="0"/>
+              </a:rPr>
+              <a:t>Facebook group!</a:t>
+            </a:r>
+          </a:p>
+        </p:txBody>
+      </p:sp>
+      <p:sp>
+        <p:nvSpPr>
+          <p:cNvPr id="14" name="TekstSylinder 13">
+            <a:extLst>
+              <a:ext uri="{FF2B5EF4-FFF2-40B4-BE49-F238E27FC236}">
+                <a16:creationId xmlns:a16="http://schemas.microsoft.com/office/drawing/2014/main" id="{45708672-E044-1E5A-3884-8C1D6C0EB753}"/>
+              </a:ext>
+            </a:extLst>
+          </p:cNvPr>
+          <p:cNvSpPr txBox="1"/>
+          <p:nvPr/>
+        </p:nvSpPr>
+        <p:spPr>
+          <a:xfrm>
+            <a:off x="5231957" y="9061427"/>
+            <a:ext cx="4391024" cy="369332"/>
+          </a:xfrm>
+          <a:prstGeom prst="rect">
+            <a:avLst/>
+          </a:prstGeom>
+          <a:noFill/>
+        </p:spPr>
+        <p:txBody>
+          <a:bodyPr wrap="square">
+            <a:spAutoFit/>
+          </a:bodyPr>
+          <a:lstStyle/>
+          <a:p>
+            <a:r>
+              <a:rPr lang="en-US" dirty="0">
+                <a:solidFill>
+                  <a:schemeClr val="bg1"/>
+                </a:solidFill>
+                <a:latin typeface="Bahnschrift" panose="020B0502040204020203" pitchFamily="34" charset="0"/>
+              </a:rPr>
+              <a:t>Tips!</a:t>
+            </a:r>
+            <a:endParaRPr lang="en-US" dirty="0"/>
+          </a:p>
+        </p:txBody>
+      </p:sp>
+      <p:sp>
+        <p:nvSpPr>
+          <p:cNvPr id="15" name="TekstSylinder 14">
+            <a:extLst>
+              <a:ext uri="{FF2B5EF4-FFF2-40B4-BE49-F238E27FC236}">
+                <a16:creationId xmlns:a16="http://schemas.microsoft.com/office/drawing/2014/main" id="{9A04AF8C-222F-ECC9-5B41-83B8E736AEEB}"/>
+              </a:ext>
+            </a:extLst>
+          </p:cNvPr>
+          <p:cNvSpPr txBox="1"/>
+          <p:nvPr/>
+        </p:nvSpPr>
+        <p:spPr>
+          <a:xfrm>
+            <a:off x="329582" y="7508970"/>
+            <a:ext cx="2521735" cy="369332"/>
+          </a:xfrm>
+          <a:prstGeom prst="rect">
+            <a:avLst/>
+          </a:prstGeom>
+          <a:noFill/>
+        </p:spPr>
+        <p:txBody>
+          <a:bodyPr wrap="square">
+            <a:spAutoFit/>
+          </a:bodyPr>
+          <a:lstStyle/>
+          <a:p>
+            <a:r>
+              <a:rPr lang="en-US" dirty="0">
+                <a:solidFill>
+                  <a:schemeClr val="bg1"/>
+                </a:solidFill>
+                <a:latin typeface="Bahnschrift" panose="020B0502040204020203" pitchFamily="34" charset="0"/>
+              </a:rPr>
+              <a:t>Map to the classroom!</a:t>
+            </a:r>
+            <a:endParaRPr lang="en-US" dirty="0"/>
+          </a:p>
+        </p:txBody>
+      </p:sp>
+      <p:sp>
+        <p:nvSpPr>
+          <p:cNvPr id="16" name="TekstSylinder 15">
+            <a:extLst>
+              <a:ext uri="{FF2B5EF4-FFF2-40B4-BE49-F238E27FC236}">
+                <a16:creationId xmlns:a16="http://schemas.microsoft.com/office/drawing/2014/main" id="{13F58D1B-E1E4-D504-1CA1-45D1BFE99B45}"/>
+              </a:ext>
+            </a:extLst>
+          </p:cNvPr>
+          <p:cNvSpPr txBox="1"/>
+          <p:nvPr/>
+        </p:nvSpPr>
+        <p:spPr>
+          <a:xfrm>
+            <a:off x="2865301" y="8854728"/>
+            <a:ext cx="4595812" cy="369332"/>
+          </a:xfrm>
+          <a:prstGeom prst="rect">
+            <a:avLst/>
+          </a:prstGeom>
+          <a:noFill/>
+        </p:spPr>
+        <p:txBody>
+          <a:bodyPr wrap="square">
+            <a:spAutoFit/>
+          </a:bodyPr>
+          <a:lstStyle/>
+          <a:p>
+            <a:r>
+              <a:rPr lang="en-US" dirty="0">
+                <a:solidFill>
+                  <a:schemeClr val="bg1"/>
+                </a:solidFill>
+                <a:latin typeface="Bahnschrift" panose="020B0502040204020203" pitchFamily="34" charset="0"/>
+              </a:rPr>
+              <a:t>Cheat sheets! </a:t>
+            </a:r>
+            <a:endParaRPr lang="en-US" dirty="0"/>
+          </a:p>
+        </p:txBody>
+      </p:sp>
+      <p:cxnSp>
+        <p:nvCxnSpPr>
+          <p:cNvPr id="17" name="Rett pilkobling 16">
+            <a:extLst>
+              <a:ext uri="{FF2B5EF4-FFF2-40B4-BE49-F238E27FC236}">
+                <a16:creationId xmlns:a16="http://schemas.microsoft.com/office/drawing/2014/main" id="{97F2B2F9-15E8-F188-1D80-9BA92F26D46F}"/>
+              </a:ext>
+            </a:extLst>
+          </p:cNvPr>
+          <p:cNvCxnSpPr>
+            <a:cxnSpLocks/>
+            <a:stCxn id="16" idx="1"/>
+          </p:cNvCxnSpPr>
+          <p:nvPr/>
+        </p:nvCxnSpPr>
+        <p:spPr>
+          <a:xfrm flipH="1">
+            <a:off x="2200275" y="9039394"/>
+            <a:ext cx="665026" cy="175272"/>
+          </a:xfrm>
+          <a:prstGeom prst="straightConnector1">
+            <a:avLst/>
+          </a:prstGeom>
+          <a:ln w="57150">
+            <a:solidFill>
+              <a:schemeClr val="bg1"/>
+            </a:solidFill>
+            <a:tailEnd type="triangle"/>
+          </a:ln>
+        </p:spPr>
+        <p:style>
+          <a:lnRef idx="3">
+            <a:schemeClr val="accent1"/>
+          </a:lnRef>
+          <a:fillRef idx="0">
+            <a:schemeClr val="accent1"/>
+          </a:fillRef>
+          <a:effectRef idx="2">
+            <a:schemeClr val="accent1"/>
+          </a:effectRef>
+          <a:fontRef idx="minor">
+            <a:schemeClr val="tx1"/>
+          </a:fontRef>
+        </p:style>
+      </p:cxnSp>
+      <p:cxnSp>
+        <p:nvCxnSpPr>
+          <p:cNvPr id="18" name="Rett pilkobling 17">
+            <a:extLst>
+              <a:ext uri="{FF2B5EF4-FFF2-40B4-BE49-F238E27FC236}">
+                <a16:creationId xmlns:a16="http://schemas.microsoft.com/office/drawing/2014/main" id="{7C60AC3F-F930-4BB6-B002-21DB3F3C79E2}"/>
+              </a:ext>
+            </a:extLst>
+          </p:cNvPr>
+          <p:cNvCxnSpPr>
+            <a:cxnSpLocks/>
+            <a:stCxn id="12" idx="1"/>
+          </p:cNvCxnSpPr>
+          <p:nvPr/>
+        </p:nvCxnSpPr>
+        <p:spPr>
+          <a:xfrm flipH="1">
+            <a:off x="2169111" y="8621191"/>
+            <a:ext cx="2539173" cy="342236"/>
+          </a:xfrm>
+          <a:prstGeom prst="straightConnector1">
+            <a:avLst/>
+          </a:prstGeom>
+          <a:ln w="57150">
+            <a:solidFill>
+              <a:schemeClr val="bg1"/>
+            </a:solidFill>
+            <a:tailEnd type="triangle"/>
+          </a:ln>
+        </p:spPr>
+        <p:style>
+          <a:lnRef idx="3">
+            <a:schemeClr val="accent1"/>
+          </a:lnRef>
+          <a:fillRef idx="0">
+            <a:schemeClr val="accent1"/>
+          </a:fillRef>
+          <a:effectRef idx="2">
+            <a:schemeClr val="accent1"/>
+          </a:effectRef>
+          <a:fontRef idx="minor">
+            <a:schemeClr val="tx1"/>
+          </a:fontRef>
+        </p:style>
+      </p:cxnSp>
+      <p:cxnSp>
+        <p:nvCxnSpPr>
+          <p:cNvPr id="19" name="Rett pilkobling 18">
+            <a:extLst>
+              <a:ext uri="{FF2B5EF4-FFF2-40B4-BE49-F238E27FC236}">
+                <a16:creationId xmlns:a16="http://schemas.microsoft.com/office/drawing/2014/main" id="{B670F647-98C6-945E-0CE0-810DF078B30A}"/>
+              </a:ext>
+            </a:extLst>
+          </p:cNvPr>
+          <p:cNvCxnSpPr>
+            <a:cxnSpLocks/>
+            <a:stCxn id="27" idx="1"/>
+          </p:cNvCxnSpPr>
+          <p:nvPr/>
+        </p:nvCxnSpPr>
+        <p:spPr>
+          <a:xfrm flipH="1">
+            <a:off x="2200275" y="8242237"/>
+            <a:ext cx="1447071" cy="490189"/>
+          </a:xfrm>
+          <a:prstGeom prst="straightConnector1">
+            <a:avLst/>
+          </a:prstGeom>
+          <a:ln w="57150">
+            <a:solidFill>
+              <a:schemeClr val="bg1"/>
+            </a:solidFill>
+            <a:tailEnd type="triangle"/>
+          </a:ln>
+        </p:spPr>
+        <p:style>
+          <a:lnRef idx="3">
+            <a:schemeClr val="accent1"/>
+          </a:lnRef>
+          <a:fillRef idx="0">
+            <a:schemeClr val="accent1"/>
+          </a:fillRef>
+          <a:effectRef idx="2">
+            <a:schemeClr val="accent1"/>
+          </a:effectRef>
+          <a:fontRef idx="minor">
+            <a:schemeClr val="tx1"/>
+          </a:fontRef>
+        </p:style>
+      </p:cxnSp>
+      <p:cxnSp>
+        <p:nvCxnSpPr>
+          <p:cNvPr id="20" name="Rett pilkobling 19">
+            <a:extLst>
+              <a:ext uri="{FF2B5EF4-FFF2-40B4-BE49-F238E27FC236}">
+                <a16:creationId xmlns:a16="http://schemas.microsoft.com/office/drawing/2014/main" id="{96FFC4EC-B70A-899F-F7A6-041F87D3FE2C}"/>
+              </a:ext>
+            </a:extLst>
+          </p:cNvPr>
+          <p:cNvCxnSpPr>
+            <a:cxnSpLocks/>
+            <a:stCxn id="15" idx="2"/>
+            <a:endCxn id="9" idx="0"/>
+          </p:cNvCxnSpPr>
+          <p:nvPr/>
+        </p:nvCxnSpPr>
+        <p:spPr>
+          <a:xfrm flipH="1">
+            <a:off x="1213368" y="7878302"/>
+            <a:ext cx="377082" cy="779925"/>
+          </a:xfrm>
+          <a:prstGeom prst="straightConnector1">
+            <a:avLst/>
+          </a:prstGeom>
+          <a:ln w="57150">
+            <a:solidFill>
+              <a:schemeClr val="bg1"/>
+            </a:solidFill>
+            <a:tailEnd type="triangle"/>
+          </a:ln>
+        </p:spPr>
+        <p:style>
+          <a:lnRef idx="3">
+            <a:schemeClr val="accent1"/>
+          </a:lnRef>
+          <a:fillRef idx="0">
+            <a:schemeClr val="accent1"/>
+          </a:fillRef>
+          <a:effectRef idx="2">
+            <a:schemeClr val="accent1"/>
+          </a:effectRef>
+          <a:fontRef idx="minor">
+            <a:schemeClr val="tx1"/>
+          </a:fontRef>
+        </p:style>
+      </p:cxnSp>
+      <p:cxnSp>
+        <p:nvCxnSpPr>
+          <p:cNvPr id="21" name="Rett pilkobling 20">
+            <a:extLst>
+              <a:ext uri="{FF2B5EF4-FFF2-40B4-BE49-F238E27FC236}">
+                <a16:creationId xmlns:a16="http://schemas.microsoft.com/office/drawing/2014/main" id="{FB1F4004-6B83-7346-B8AE-36CE791CF789}"/>
+              </a:ext>
+            </a:extLst>
+          </p:cNvPr>
+          <p:cNvCxnSpPr>
+            <a:cxnSpLocks/>
+            <a:stCxn id="10" idx="1"/>
+          </p:cNvCxnSpPr>
+          <p:nvPr/>
+        </p:nvCxnSpPr>
+        <p:spPr>
+          <a:xfrm flipH="1">
+            <a:off x="1895475" y="7791331"/>
+            <a:ext cx="1007862" cy="851557"/>
+          </a:xfrm>
+          <a:prstGeom prst="straightConnector1">
+            <a:avLst/>
+          </a:prstGeom>
+          <a:ln w="57150">
+            <a:solidFill>
+              <a:schemeClr val="bg1"/>
+            </a:solidFill>
+            <a:tailEnd type="triangle"/>
+          </a:ln>
+        </p:spPr>
+        <p:style>
+          <a:lnRef idx="3">
+            <a:schemeClr val="accent1"/>
+          </a:lnRef>
+          <a:fillRef idx="0">
+            <a:schemeClr val="accent1"/>
+          </a:fillRef>
+          <a:effectRef idx="2">
+            <a:schemeClr val="accent1"/>
+          </a:effectRef>
+          <a:fontRef idx="minor">
+            <a:schemeClr val="tx1"/>
+          </a:fontRef>
+        </p:style>
+      </p:cxnSp>
+      <p:cxnSp>
+        <p:nvCxnSpPr>
+          <p:cNvPr id="22" name="Rett pilkobling 21">
+            <a:extLst>
+              <a:ext uri="{FF2B5EF4-FFF2-40B4-BE49-F238E27FC236}">
+                <a16:creationId xmlns:a16="http://schemas.microsoft.com/office/drawing/2014/main" id="{721DA7FF-0938-B519-78B6-A88C5AAB4B39}"/>
+              </a:ext>
+            </a:extLst>
+          </p:cNvPr>
+          <p:cNvCxnSpPr>
+            <a:cxnSpLocks/>
+            <a:stCxn id="14" idx="1"/>
+          </p:cNvCxnSpPr>
+          <p:nvPr/>
+        </p:nvCxnSpPr>
+        <p:spPr>
+          <a:xfrm flipH="1">
+            <a:off x="2240476" y="9246093"/>
+            <a:ext cx="2991481" cy="147251"/>
+          </a:xfrm>
+          <a:prstGeom prst="straightConnector1">
+            <a:avLst/>
+          </a:prstGeom>
+          <a:ln w="57150">
+            <a:solidFill>
+              <a:schemeClr val="bg1"/>
+            </a:solidFill>
+            <a:tailEnd type="triangle"/>
+          </a:ln>
+        </p:spPr>
+        <p:style>
+          <a:lnRef idx="3">
+            <a:schemeClr val="accent1"/>
+          </a:lnRef>
+          <a:fillRef idx="0">
+            <a:schemeClr val="accent1"/>
+          </a:fillRef>
+          <a:effectRef idx="2">
+            <a:schemeClr val="accent1"/>
+          </a:effectRef>
+          <a:fontRef idx="minor">
+            <a:schemeClr val="tx1"/>
+          </a:fontRef>
+        </p:style>
+      </p:cxnSp>
+      <p:sp>
+        <p:nvSpPr>
+          <p:cNvPr id="27" name="TekstSylinder 26">
+            <a:extLst>
+              <a:ext uri="{FF2B5EF4-FFF2-40B4-BE49-F238E27FC236}">
+                <a16:creationId xmlns:a16="http://schemas.microsoft.com/office/drawing/2014/main" id="{37662B89-DA6E-B9A3-0E68-CEC361BC82A4}"/>
+              </a:ext>
+            </a:extLst>
+          </p:cNvPr>
+          <p:cNvSpPr txBox="1"/>
+          <p:nvPr/>
+        </p:nvSpPr>
+        <p:spPr>
+          <a:xfrm>
+            <a:off x="3647346" y="8057571"/>
+            <a:ext cx="1926431" cy="369332"/>
+          </a:xfrm>
+          <a:prstGeom prst="rect">
+            <a:avLst/>
+          </a:prstGeom>
+          <a:noFill/>
+        </p:spPr>
+        <p:txBody>
+          <a:bodyPr wrap="square">
+            <a:spAutoFit/>
+          </a:bodyPr>
+          <a:lstStyle/>
+          <a:p>
+            <a:r>
+              <a:rPr lang="en-US" dirty="0">
+                <a:solidFill>
+                  <a:schemeClr val="bg1"/>
+                </a:solidFill>
+                <a:latin typeface="Bahnschrift" panose="020B0502040204020203" pitchFamily="34" charset="0"/>
+              </a:rPr>
+              <a:t>Free books on R!</a:t>
+            </a:r>
+          </a:p>
+        </p:txBody>
+      </p:sp>
+      <p:pic>
+        <p:nvPicPr>
+          <p:cNvPr id="33" name="Bilde 32" descr="Et bilde som inneholder Font, Grafikk, tekst, logo&#10;&#10;Automatisk generert beskrivelse">
+            <a:extLst>
+              <a:ext uri="{FF2B5EF4-FFF2-40B4-BE49-F238E27FC236}">
+                <a16:creationId xmlns:a16="http://schemas.microsoft.com/office/drawing/2014/main" id="{879CEA0D-C6C4-92DE-A498-A2A2AE3FA3F4}"/>
+              </a:ext>
+            </a:extLst>
+          </p:cNvPr>
+          <p:cNvPicPr>
+            <a:picLocks noChangeAspect="1"/>
+          </p:cNvPicPr>
+          <p:nvPr/>
+        </p:nvPicPr>
+        <p:blipFill rotWithShape="1">
+          <a:blip r:embed="rId4">
+            <a:extLst>
+              <a:ext uri="{28A0092B-C50C-407E-A947-70E740481C1C}">
+                <a14:useLocalDpi xmlns:a14="http://schemas.microsoft.com/office/drawing/2010/main" val="0"/>
+              </a:ext>
+            </a:extLst>
+          </a:blip>
+          <a:srcRect l="-1" r="-524"/>
+          <a:stretch/>
+        </p:blipFill>
+        <p:spPr>
+          <a:xfrm>
+            <a:off x="5538632" y="3766719"/>
+            <a:ext cx="1741740" cy="608429"/>
+          </a:xfrm>
+          <a:prstGeom prst="rect">
+            <a:avLst/>
+          </a:prstGeom>
+        </p:spPr>
+      </p:pic>
+      <p:sp>
+        <p:nvSpPr>
+          <p:cNvPr id="35" name="TekstSylinder 34">
+            <a:extLst>
+              <a:ext uri="{FF2B5EF4-FFF2-40B4-BE49-F238E27FC236}">
+                <a16:creationId xmlns:a16="http://schemas.microsoft.com/office/drawing/2014/main" id="{30CD2C17-C54E-0240-BACA-0C8CEF18BA6D}"/>
+              </a:ext>
+            </a:extLst>
+          </p:cNvPr>
+          <p:cNvSpPr txBox="1"/>
+          <p:nvPr/>
+        </p:nvSpPr>
+        <p:spPr>
+          <a:xfrm>
+            <a:off x="5095082" y="3729304"/>
+            <a:ext cx="4814886" cy="369332"/>
+          </a:xfrm>
+          <a:prstGeom prst="rect">
+            <a:avLst/>
+          </a:prstGeom>
+          <a:noFill/>
+        </p:spPr>
+        <p:txBody>
+          <a:bodyPr wrap="square">
+            <a:spAutoFit/>
+          </a:bodyPr>
+          <a:lstStyle/>
+          <a:p>
+            <a:r>
+              <a:rPr lang="en-US" b="1" dirty="0">
+                <a:latin typeface="Bahnschrift" panose="020B0502040204020203" pitchFamily="34" charset="0"/>
+              </a:rPr>
+              <a:t>or</a:t>
+            </a:r>
+            <a:endParaRPr lang="en-US" dirty="0"/>
           </a:p>
         </p:txBody>
       </p:sp>

</xml_diff>

<commit_message>
Corrected small problems with the new ads.
</commit_message>
<xml_diff>
--- a/ADs/RCLUB_AD.pptx
+++ b/ADs/RCLUB_AD.pptx
@@ -4176,8 +4176,8 @@
         </p:nvSpPr>
         <p:spPr>
           <a:xfrm>
-            <a:off x="204060" y="3518175"/>
-            <a:ext cx="3786186" cy="400110"/>
+            <a:off x="277950" y="3517134"/>
+            <a:ext cx="3786186" cy="646331"/>
           </a:xfrm>
           <a:prstGeom prst="rect">
             <a:avLst/>
@@ -4191,7 +4191,7 @@
           <a:lstStyle/>
           <a:p>
             <a:r>
-              <a:rPr lang="en-US" sz="2000" b="1" i="1" u="sng" dirty="0">
+              <a:rPr lang="en-US" sz="1800" b="1" i="1" u="sng" dirty="0">
                 <a:solidFill>
                   <a:schemeClr val="bg1"/>
                 </a:solidFill>
@@ -4200,7 +4200,7 @@
               <a:t>Vi er </a:t>
             </a:r>
             <a:r>
-              <a:rPr lang="en-US" sz="2000" b="1" i="1" u="sng" dirty="0" err="1">
+              <a:rPr lang="en-US" sz="1800" b="1" i="1" u="sng" dirty="0" err="1">
                 <a:solidFill>
                   <a:schemeClr val="bg1"/>
                 </a:solidFill>
@@ -4209,7 +4209,7 @@
               <a:t>nå</a:t>
             </a:r>
             <a:r>
-              <a:rPr lang="en-US" sz="2000" b="1" i="1" u="sng" dirty="0">
+              <a:rPr lang="en-US" sz="1800" b="1" i="1" u="sng" dirty="0">
                 <a:solidFill>
                   <a:schemeClr val="bg1"/>
                 </a:solidFill>
@@ -4218,7 +4218,7 @@
               <a:t> </a:t>
             </a:r>
             <a:r>
-              <a:rPr lang="en-US" sz="2000" b="1" i="1" u="sng" dirty="0" err="1">
+              <a:rPr lang="en-US" sz="1800" b="1" i="1" u="sng" dirty="0" err="1">
                 <a:solidFill>
                   <a:schemeClr val="bg1"/>
                 </a:solidFill>
@@ -4227,7 +4227,7 @@
               <a:t>også</a:t>
             </a:r>
             <a:r>
-              <a:rPr lang="en-US" sz="2000" b="1" i="1" u="sng" dirty="0">
+              <a:rPr lang="en-US" sz="1800" b="1" i="1" u="sng" dirty="0">
                 <a:solidFill>
                   <a:schemeClr val="bg1"/>
                 </a:solidFill>
@@ -4236,7 +4236,7 @@
               <a:t> </a:t>
             </a:r>
             <a:r>
-              <a:rPr lang="en-US" sz="2000" b="1" i="1" u="sng" dirty="0" err="1">
+              <a:rPr lang="en-US" sz="1800" b="1" i="1" u="sng" dirty="0" err="1">
                 <a:solidFill>
                   <a:schemeClr val="bg1"/>
                 </a:solidFill>
@@ -4245,7 +4245,7 @@
               <a:t>på</a:t>
             </a:r>
             <a:r>
-              <a:rPr lang="en-US" sz="2000" b="1" i="1" u="sng" dirty="0">
+              <a:rPr lang="en-US" sz="1800" b="1" i="1" u="sng" dirty="0">
                 <a:solidFill>
                   <a:schemeClr val="bg1"/>
                 </a:solidFill>
@@ -4254,7 +4254,7 @@
               <a:t> </a:t>
             </a:r>
             <a:r>
-              <a:rPr lang="en-US" sz="2000" b="1" i="1" u="sng" dirty="0" err="1">
+              <a:rPr lang="en-US" sz="1800" b="1" i="1" u="sng" dirty="0" err="1">
                 <a:solidFill>
                   <a:schemeClr val="bg1"/>
                 </a:solidFill>
@@ -4263,7 +4263,7 @@
               <a:t>nett</a:t>
             </a:r>
             <a:r>
-              <a:rPr lang="en-US" sz="2000" b="1" i="1" u="sng" dirty="0">
+              <a:rPr lang="en-US" sz="1800" b="1" i="1" u="sng" dirty="0">
                 <a:solidFill>
                   <a:schemeClr val="bg1"/>
                 </a:solidFill>
@@ -4271,6 +4271,9 @@
               </a:rPr>
               <a:t>!</a:t>
             </a:r>
+            <a:endParaRPr lang="en-US" b="1" i="1" u="sng" dirty="0"/>
+          </a:p>
+          <a:p>
             <a:endParaRPr lang="en-US" b="1" i="1" u="sng" dirty="0"/>
           </a:p>
         </p:txBody>
@@ -4881,6 +4884,79 @@
           </a:fontRef>
         </p:style>
       </p:cxnSp>
+      <p:pic>
+        <p:nvPicPr>
+          <p:cNvPr id="3" name="Bilde 2" descr="Et bilde som inneholder Font, Grafikk, tekst, logo&#10;&#10;Automatisk generert beskrivelse">
+            <a:extLst>
+              <a:ext uri="{FF2B5EF4-FFF2-40B4-BE49-F238E27FC236}">
+                <a16:creationId xmlns:a16="http://schemas.microsoft.com/office/drawing/2014/main" id="{54CB066F-1C23-955E-BA7F-ECE5A391C526}"/>
+              </a:ext>
+            </a:extLst>
+          </p:cNvPr>
+          <p:cNvPicPr>
+            <a:picLocks noChangeAspect="1"/>
+          </p:cNvPicPr>
+          <p:nvPr/>
+        </p:nvPicPr>
+        <p:blipFill rotWithShape="1">
+          <a:blip r:embed="rId5">
+            <a:extLst>
+              <a:ext uri="{28A0092B-C50C-407E-A947-70E740481C1C}">
+                <a14:useLocalDpi xmlns:a14="http://schemas.microsoft.com/office/drawing/2010/main" val="0"/>
+              </a:ext>
+            </a:extLst>
+          </a:blip>
+          <a:srcRect l="-1" r="-524"/>
+          <a:stretch/>
+        </p:blipFill>
+        <p:spPr>
+          <a:xfrm>
+            <a:off x="5538632" y="3766719"/>
+            <a:ext cx="1741740" cy="608429"/>
+          </a:xfrm>
+          <a:prstGeom prst="rect">
+            <a:avLst/>
+          </a:prstGeom>
+        </p:spPr>
+      </p:pic>
+      <p:sp>
+        <p:nvSpPr>
+          <p:cNvPr id="4" name="TekstSylinder 3">
+            <a:extLst>
+              <a:ext uri="{FF2B5EF4-FFF2-40B4-BE49-F238E27FC236}">
+                <a16:creationId xmlns:a16="http://schemas.microsoft.com/office/drawing/2014/main" id="{D9FCF841-790A-3A05-30CF-855DE96FB54A}"/>
+              </a:ext>
+            </a:extLst>
+          </p:cNvPr>
+          <p:cNvSpPr txBox="1"/>
+          <p:nvPr/>
+        </p:nvSpPr>
+        <p:spPr>
+          <a:xfrm>
+            <a:off x="5095082" y="3729304"/>
+            <a:ext cx="4814886" cy="369332"/>
+          </a:xfrm>
+          <a:prstGeom prst="rect">
+            <a:avLst/>
+          </a:prstGeom>
+          <a:noFill/>
+        </p:spPr>
+        <p:txBody>
+          <a:bodyPr wrap="square">
+            <a:spAutoFit/>
+          </a:bodyPr>
+          <a:lstStyle/>
+          <a:p>
+            <a:r>
+              <a:rPr lang="en-US" b="1" dirty="0">
+                <a:latin typeface="Bahnschrift" panose="020B0502040204020203" pitchFamily="34" charset="0"/>
+              </a:rPr>
+              <a:t>or</a:t>
+            </a:r>
+            <a:endParaRPr lang="en-US" dirty="0"/>
+          </a:p>
+        </p:txBody>
+      </p:sp>
     </p:spTree>
     <p:extLst>
       <p:ext uri="{BB962C8B-B14F-4D97-AF65-F5344CB8AC3E}">
@@ -6457,6 +6533,47 @@
           </a:p>
         </p:txBody>
       </p:sp>
+      <p:sp>
+        <p:nvSpPr>
+          <p:cNvPr id="6" name="TekstSylinder 5">
+            <a:extLst>
+              <a:ext uri="{FF2B5EF4-FFF2-40B4-BE49-F238E27FC236}">
+                <a16:creationId xmlns:a16="http://schemas.microsoft.com/office/drawing/2014/main" id="{7F85B638-AFA0-BD3C-5B1E-AEDE43744563}"/>
+              </a:ext>
+            </a:extLst>
+          </p:cNvPr>
+          <p:cNvSpPr txBox="1"/>
+          <p:nvPr/>
+        </p:nvSpPr>
+        <p:spPr>
+          <a:xfrm>
+            <a:off x="279303" y="3536969"/>
+            <a:ext cx="4956312" cy="369332"/>
+          </a:xfrm>
+          <a:prstGeom prst="rect">
+            <a:avLst/>
+          </a:prstGeom>
+          <a:noFill/>
+        </p:spPr>
+        <p:txBody>
+          <a:bodyPr wrap="square">
+            <a:spAutoFit/>
+          </a:bodyPr>
+          <a:lstStyle/>
+          <a:p>
+            <a:r>
+              <a:rPr lang="en-US" sz="1800" b="1" i="1" u="sng" dirty="0">
+                <a:solidFill>
+                  <a:schemeClr val="bg1"/>
+                </a:solidFill>
+                <a:latin typeface="Bahnschrift" panose="020B0502040204020203" pitchFamily="34" charset="0"/>
+              </a:rPr>
+              <a:t>We are now also online!</a:t>
+            </a:r>
+            <a:endParaRPr lang="en-US" b="1" i="1" u="sng" dirty="0"/>
+          </a:p>
+        </p:txBody>
+      </p:sp>
     </p:spTree>
     <p:extLst>
       <p:ext uri="{BB962C8B-B14F-4D97-AF65-F5344CB8AC3E}">

</xml_diff>

<commit_message>
Removed a line from the ad.
</commit_message>
<xml_diff>
--- a/ADs/RCLUB_AD.pptx
+++ b/ADs/RCLUB_AD.pptx
@@ -244,7 +244,7 @@
           <a:p>
             <a:fld id="{9567F887-F087-4807-8063-BBB38B068098}" type="datetimeFigureOut">
               <a:rPr lang="en-US" smtClean="0"/>
-              <a:t>2/12/2024</a:t>
+              <a:t>2/14/2024</a:t>
             </a:fld>
             <a:endParaRPr lang="en-US"/>
           </a:p>
@@ -414,7 +414,7 @@
           <a:p>
             <a:fld id="{9567F887-F087-4807-8063-BBB38B068098}" type="datetimeFigureOut">
               <a:rPr lang="en-US" smtClean="0"/>
-              <a:t>2/12/2024</a:t>
+              <a:t>2/14/2024</a:t>
             </a:fld>
             <a:endParaRPr lang="en-US"/>
           </a:p>
@@ -594,7 +594,7 @@
           <a:p>
             <a:fld id="{9567F887-F087-4807-8063-BBB38B068098}" type="datetimeFigureOut">
               <a:rPr lang="en-US" smtClean="0"/>
-              <a:t>2/12/2024</a:t>
+              <a:t>2/14/2024</a:t>
             </a:fld>
             <a:endParaRPr lang="en-US"/>
           </a:p>
@@ -764,7 +764,7 @@
           <a:p>
             <a:fld id="{9567F887-F087-4807-8063-BBB38B068098}" type="datetimeFigureOut">
               <a:rPr lang="en-US" smtClean="0"/>
-              <a:t>2/12/2024</a:t>
+              <a:t>2/14/2024</a:t>
             </a:fld>
             <a:endParaRPr lang="en-US"/>
           </a:p>
@@ -1008,7 +1008,7 @@
           <a:p>
             <a:fld id="{9567F887-F087-4807-8063-BBB38B068098}" type="datetimeFigureOut">
               <a:rPr lang="en-US" smtClean="0"/>
-              <a:t>2/12/2024</a:t>
+              <a:t>2/14/2024</a:t>
             </a:fld>
             <a:endParaRPr lang="en-US"/>
           </a:p>
@@ -1240,7 +1240,7 @@
           <a:p>
             <a:fld id="{9567F887-F087-4807-8063-BBB38B068098}" type="datetimeFigureOut">
               <a:rPr lang="en-US" smtClean="0"/>
-              <a:t>2/12/2024</a:t>
+              <a:t>2/14/2024</a:t>
             </a:fld>
             <a:endParaRPr lang="en-US"/>
           </a:p>
@@ -1607,7 +1607,7 @@
           <a:p>
             <a:fld id="{9567F887-F087-4807-8063-BBB38B068098}" type="datetimeFigureOut">
               <a:rPr lang="en-US" smtClean="0"/>
-              <a:t>2/12/2024</a:t>
+              <a:t>2/14/2024</a:t>
             </a:fld>
             <a:endParaRPr lang="en-US"/>
           </a:p>
@@ -1725,7 +1725,7 @@
           <a:p>
             <a:fld id="{9567F887-F087-4807-8063-BBB38B068098}" type="datetimeFigureOut">
               <a:rPr lang="en-US" smtClean="0"/>
-              <a:t>2/12/2024</a:t>
+              <a:t>2/14/2024</a:t>
             </a:fld>
             <a:endParaRPr lang="en-US"/>
           </a:p>
@@ -1820,7 +1820,7 @@
           <a:p>
             <a:fld id="{9567F887-F087-4807-8063-BBB38B068098}" type="datetimeFigureOut">
               <a:rPr lang="en-US" smtClean="0"/>
-              <a:t>2/12/2024</a:t>
+              <a:t>2/14/2024</a:t>
             </a:fld>
             <a:endParaRPr lang="en-US"/>
           </a:p>
@@ -2097,7 +2097,7 @@
           <a:p>
             <a:fld id="{9567F887-F087-4807-8063-BBB38B068098}" type="datetimeFigureOut">
               <a:rPr lang="en-US" smtClean="0"/>
-              <a:t>2/12/2024</a:t>
+              <a:t>2/14/2024</a:t>
             </a:fld>
             <a:endParaRPr lang="en-US"/>
           </a:p>
@@ -2354,7 +2354,7 @@
           <a:p>
             <a:fld id="{9567F887-F087-4807-8063-BBB38B068098}" type="datetimeFigureOut">
               <a:rPr lang="en-US" smtClean="0"/>
-              <a:t>2/12/2024</a:t>
+              <a:t>2/14/2024</a:t>
             </a:fld>
             <a:endParaRPr lang="en-US"/>
           </a:p>
@@ -2567,7 +2567,7 @@
           <a:p>
             <a:fld id="{9567F887-F087-4807-8063-BBB38B068098}" type="datetimeFigureOut">
               <a:rPr lang="en-US" smtClean="0"/>
-              <a:t>2/12/2024</a:t>
+              <a:t>2/14/2024</a:t>
             </a:fld>
             <a:endParaRPr lang="en-US"/>
           </a:p>
@@ -3468,7 +3468,7 @@
         <p:spPr>
           <a:xfrm>
             <a:off x="279303" y="3927546"/>
-            <a:ext cx="7058219" cy="3970318"/>
+            <a:ext cx="7058219" cy="3693319"/>
           </a:xfrm>
           <a:custGeom>
             <a:avLst/>
@@ -3839,17 +3839,6 @@
                 <a:latin typeface="Bahnschrift" panose="020B0502040204020203" pitchFamily="34" charset="0"/>
               </a:rPr>
               <a:t>Sliter du med å analysere datasettene dine?</a:t>
-            </a:r>
-          </a:p>
-          <a:p>
-            <a:r>
-              <a:rPr lang="nb-NO" dirty="0">
-                <a:solidFill>
-                  <a:schemeClr val="bg1"/>
-                </a:solidFill>
-                <a:latin typeface="Bahnschrift" panose="020B0502040204020203" pitchFamily="34" charset="0"/>
-              </a:rPr>
-              <a:t>Kan veilederen din alt annet enn programmering?</a:t>
             </a:r>
           </a:p>
           <a:p>
@@ -5399,7 +5388,7 @@
         <p:spPr>
           <a:xfrm>
             <a:off x="279303" y="4032775"/>
-            <a:ext cx="7058219" cy="3416320"/>
+            <a:ext cx="7058219" cy="3139321"/>
           </a:xfrm>
           <a:custGeom>
             <a:avLst/>
@@ -5740,37 +5729,23 @@
                 </a:solidFill>
                 <a:latin typeface="Bahnschrift" panose="020B0502040204020203" pitchFamily="34" charset="0"/>
               </a:rPr>
-              <a:t>Does your code just return error messages?</a:t>
-            </a:r>
-          </a:p>
-          <a:p>
-            <a:r>
-              <a:rPr lang="en-US" dirty="0">
-                <a:solidFill>
-                  <a:schemeClr val="bg1"/>
-                </a:solidFill>
-                <a:latin typeface="Bahnschrift" panose="020B0502040204020203" pitchFamily="34" charset="0"/>
-              </a:rPr>
-              <a:t>Does your advisor know </a:t>
-            </a:r>
-            <a:r>
-              <a:rPr lang="en-US" i="1" dirty="0">
-                <a:solidFill>
-                  <a:schemeClr val="bg1"/>
-                </a:solidFill>
-                <a:latin typeface="Bahnschrift" panose="020B0502040204020203" pitchFamily="34" charset="0"/>
-              </a:rPr>
-              <a:t>everything, </a:t>
-            </a:r>
-            <a:r>
-              <a:rPr lang="en-US" dirty="0">
-                <a:solidFill>
-                  <a:schemeClr val="bg1"/>
-                </a:solidFill>
-                <a:latin typeface="Bahnschrift" panose="020B0502040204020203" pitchFamily="34" charset="0"/>
-              </a:rPr>
-              <a:t>except R?</a:t>
-            </a:r>
+              <a:t>Does your code just return error </a:t>
+            </a:r>
+            <a:r>
+              <a:rPr lang="en-US">
+                <a:solidFill>
+                  <a:schemeClr val="bg1"/>
+                </a:solidFill>
+                <a:latin typeface="Bahnschrift" panose="020B0502040204020203" pitchFamily="34" charset="0"/>
+              </a:rPr>
+              <a:t>messages?</a:t>
+            </a:r>
+            <a:endParaRPr lang="en-US" dirty="0">
+              <a:solidFill>
+                <a:schemeClr val="bg1"/>
+              </a:solidFill>
+              <a:latin typeface="Bahnschrift" panose="020B0502040204020203" pitchFamily="34" charset="0"/>
+            </a:endParaRPr>
           </a:p>
           <a:p>
             <a:endParaRPr lang="en-US" dirty="0">

</xml_diff>